<commit_message>
Added new experiments with river pollution data
</commit_message>
<xml_diff>
--- a/output/presentations/update_2/update_110724.pptx
+++ b/output/presentations/update_2/update_110724.pptx
@@ -6,12 +6,13 @@
   </p:sldMasterIdLst>
   <p:sldIdLst>
     <p:sldId id="256" r:id="rId2"/>
-    <p:sldId id="260" r:id="rId3"/>
-    <p:sldId id="259" r:id="rId4"/>
-    <p:sldId id="257" r:id="rId5"/>
-    <p:sldId id="258" r:id="rId6"/>
-    <p:sldId id="261" r:id="rId7"/>
-    <p:sldId id="262" r:id="rId8"/>
+    <p:sldId id="263" r:id="rId3"/>
+    <p:sldId id="260" r:id="rId4"/>
+    <p:sldId id="259" r:id="rId5"/>
+    <p:sldId id="257" r:id="rId6"/>
+    <p:sldId id="258" r:id="rId7"/>
+    <p:sldId id="261" r:id="rId8"/>
+    <p:sldId id="262" r:id="rId9"/>
   </p:sldIdLst>
   <p:sldSz cx="12192000" cy="6858000"/>
   <p:notesSz cx="6858000" cy="9144000"/>
@@ -110,7 +111,104 @@
       </a:defRPr>
     </a:lvl9pPr>
   </p:defaultTextStyle>
+  <p:extLst>
+    <p:ext uri="{EFAFB233-063F-42B5-8137-9DF3F51BA10A}">
+      <p15:sldGuideLst xmlns:p15="http://schemas.microsoft.com/office/powerpoint/2012/main"/>
+    </p:ext>
+  </p:extLst>
 </p:presentation>
+</file>
+
+<file path=ppt/revisionInfo.xml><?xml version="1.0" encoding="utf-8"?>
+<p1510:revInfo xmlns:a="http://schemas.openxmlformats.org/drawingml/2006/main" xmlns:r="http://schemas.openxmlformats.org/officeDocument/2006/relationships" xmlns:p1510="http://schemas.microsoft.com/office/powerpoint/2015/10/main">
+  <p1510:revLst>
+    <p1510:client id="{401B78BF-DC41-884A-B21F-E70A9CDE603A}" v="3" dt="2024-08-30T13:24:51.179"/>
+  </p1510:revLst>
+</p1510:revInfo>
+</file>
+
+<file path=ppt/changesInfos/changesInfo1.xml><?xml version="1.0" encoding="utf-8"?>
+<pc:chgInfo xmlns:a="http://schemas.openxmlformats.org/drawingml/2006/main" xmlns:r="http://schemas.openxmlformats.org/officeDocument/2006/relationships" xmlns:ac="http://schemas.microsoft.com/office/drawing/2013/main/command" xmlns:pc="http://schemas.microsoft.com/office/powerpoint/2013/main/command">
+  <pc:docChgLst>
+    <pc:chgData name="Felix Schulz" userId="c249e667a52bee35" providerId="LiveId" clId="{401B78BF-DC41-884A-B21F-E70A9CDE603A}"/>
+    <pc:docChg chg="undo custSel addSld modSld">
+      <pc:chgData name="Felix Schulz" userId="c249e667a52bee35" providerId="LiveId" clId="{401B78BF-DC41-884A-B21F-E70A9CDE603A}" dt="2024-08-30T13:32:54.055" v="106" actId="208"/>
+      <pc:docMkLst>
+        <pc:docMk/>
+      </pc:docMkLst>
+      <pc:sldChg chg="addSp modSp mod">
+        <pc:chgData name="Felix Schulz" userId="c249e667a52bee35" providerId="LiveId" clId="{401B78BF-DC41-884A-B21F-E70A9CDE603A}" dt="2024-08-30T13:27:22.687" v="68" actId="1036"/>
+        <pc:sldMkLst>
+          <pc:docMk/>
+          <pc:sldMk cId="182582306" sldId="256"/>
+        </pc:sldMkLst>
+        <pc:spChg chg="mod">
+          <ac:chgData name="Felix Schulz" userId="c249e667a52bee35" providerId="LiveId" clId="{401B78BF-DC41-884A-B21F-E70A9CDE603A}" dt="2024-08-30T13:26:39.545" v="51" actId="1076"/>
+          <ac:spMkLst>
+            <pc:docMk/>
+            <pc:sldMk cId="182582306" sldId="256"/>
+            <ac:spMk id="2" creationId="{566AC739-3532-C178-736B-056ECEEE29A3}"/>
+          </ac:spMkLst>
+        </pc:spChg>
+        <pc:spChg chg="mod">
+          <ac:chgData name="Felix Schulz" userId="c249e667a52bee35" providerId="LiveId" clId="{401B78BF-DC41-884A-B21F-E70A9CDE603A}" dt="2024-08-30T13:27:22.687" v="68" actId="1036"/>
+          <ac:spMkLst>
+            <pc:docMk/>
+            <pc:sldMk cId="182582306" sldId="256"/>
+            <ac:spMk id="3" creationId="{218F06DB-86D4-D284-FDD7-C97DE2F56732}"/>
+          </ac:spMkLst>
+        </pc:spChg>
+        <pc:picChg chg="add mod">
+          <ac:chgData name="Felix Schulz" userId="c249e667a52bee35" providerId="LiveId" clId="{401B78BF-DC41-884A-B21F-E70A9CDE603A}" dt="2024-08-30T13:25:38.667" v="44" actId="1076"/>
+          <ac:picMkLst>
+            <pc:docMk/>
+            <pc:sldMk cId="182582306" sldId="256"/>
+            <ac:picMk id="5" creationId="{0243DA93-4779-1423-9E42-8682219CD350}"/>
+          </ac:picMkLst>
+        </pc:picChg>
+      </pc:sldChg>
+      <pc:sldChg chg="addSp delSp modSp new mod">
+        <pc:chgData name="Felix Schulz" userId="c249e667a52bee35" providerId="LiveId" clId="{401B78BF-DC41-884A-B21F-E70A9CDE603A}" dt="2024-08-30T13:32:54.055" v="106" actId="208"/>
+        <pc:sldMkLst>
+          <pc:docMk/>
+          <pc:sldMk cId="2389481547" sldId="263"/>
+        </pc:sldMkLst>
+        <pc:spChg chg="mod">
+          <ac:chgData name="Felix Schulz" userId="c249e667a52bee35" providerId="LiveId" clId="{401B78BF-DC41-884A-B21F-E70A9CDE603A}" dt="2024-08-30T13:28:58.957" v="72"/>
+          <ac:spMkLst>
+            <pc:docMk/>
+            <pc:sldMk cId="2389481547" sldId="263"/>
+            <ac:spMk id="2" creationId="{5AB0CA57-AC28-397C-C408-9A10C8F560AD}"/>
+          </ac:spMkLst>
+        </pc:spChg>
+        <pc:spChg chg="mod">
+          <ac:chgData name="Felix Schulz" userId="c249e667a52bee35" providerId="LiveId" clId="{401B78BF-DC41-884A-B21F-E70A9CDE603A}" dt="2024-08-30T13:32:15.116" v="103" actId="27636"/>
+          <ac:spMkLst>
+            <pc:docMk/>
+            <pc:sldMk cId="2389481547" sldId="263"/>
+            <ac:spMk id="3" creationId="{5A90B19B-87E2-AA90-5F5A-7F6FCB39147E}"/>
+          </ac:spMkLst>
+        </pc:spChg>
+        <pc:spChg chg="add del mod">
+          <ac:chgData name="Felix Schulz" userId="c249e667a52bee35" providerId="LiveId" clId="{401B78BF-DC41-884A-B21F-E70A9CDE603A}" dt="2024-08-30T13:30:04.952" v="84" actId="478"/>
+          <ac:spMkLst>
+            <pc:docMk/>
+            <pc:sldMk cId="2389481547" sldId="263"/>
+            <ac:spMk id="5" creationId="{1C51FB62-9F23-325D-01C1-71521BC89506}"/>
+          </ac:spMkLst>
+        </pc:spChg>
+        <pc:cxnChg chg="add mod">
+          <ac:chgData name="Felix Schulz" userId="c249e667a52bee35" providerId="LiveId" clId="{401B78BF-DC41-884A-B21F-E70A9CDE603A}" dt="2024-08-30T13:32:54.055" v="106" actId="208"/>
+          <ac:cxnSpMkLst>
+            <pc:docMk/>
+            <pc:sldMk cId="2389481547" sldId="263"/>
+            <ac:cxnSpMk id="7" creationId="{FE72FFD6-1F97-7345-1C51-28EB9D195412}"/>
+          </ac:cxnSpMkLst>
+        </pc:cxnChg>
+      </pc:sldChg>
+    </pc:docChg>
+  </pc:docChgLst>
+</pc:chgInfo>
 </file>
 
 <file path=ppt/slideLayouts/slideLayout1.xml><?xml version="1.0" encoding="utf-8"?>
@@ -262,7 +360,7 @@
           <a:p>
             <a:fld id="{730781BF-9B5A-584C-A5E5-2579FF7A588D}" type="datetimeFigureOut">
               <a:rPr lang="en-US" smtClean="0"/>
-              <a:t>7/11/24</a:t>
+              <a:t>8/30/24</a:t>
             </a:fld>
             <a:endParaRPr lang="en-US"/>
           </a:p>
@@ -462,7 +560,7 @@
           <a:p>
             <a:fld id="{730781BF-9B5A-584C-A5E5-2579FF7A588D}" type="datetimeFigureOut">
               <a:rPr lang="en-US" smtClean="0"/>
-              <a:t>7/11/24</a:t>
+              <a:t>8/30/24</a:t>
             </a:fld>
             <a:endParaRPr lang="en-US"/>
           </a:p>
@@ -672,7 +770,7 @@
           <a:p>
             <a:fld id="{730781BF-9B5A-584C-A5E5-2579FF7A588D}" type="datetimeFigureOut">
               <a:rPr lang="en-US" smtClean="0"/>
-              <a:t>7/11/24</a:t>
+              <a:t>8/30/24</a:t>
             </a:fld>
             <a:endParaRPr lang="en-US"/>
           </a:p>
@@ -872,7 +970,7 @@
           <a:p>
             <a:fld id="{730781BF-9B5A-584C-A5E5-2579FF7A588D}" type="datetimeFigureOut">
               <a:rPr lang="en-US" smtClean="0"/>
-              <a:t>7/11/24</a:t>
+              <a:t>8/30/24</a:t>
             </a:fld>
             <a:endParaRPr lang="en-US"/>
           </a:p>
@@ -1148,7 +1246,7 @@
           <a:p>
             <a:fld id="{730781BF-9B5A-584C-A5E5-2579FF7A588D}" type="datetimeFigureOut">
               <a:rPr lang="en-US" smtClean="0"/>
-              <a:t>7/11/24</a:t>
+              <a:t>8/30/24</a:t>
             </a:fld>
             <a:endParaRPr lang="en-US"/>
           </a:p>
@@ -1416,7 +1514,7 @@
           <a:p>
             <a:fld id="{730781BF-9B5A-584C-A5E5-2579FF7A588D}" type="datetimeFigureOut">
               <a:rPr lang="en-US" smtClean="0"/>
-              <a:t>7/11/24</a:t>
+              <a:t>8/30/24</a:t>
             </a:fld>
             <a:endParaRPr lang="en-US"/>
           </a:p>
@@ -1831,7 +1929,7 @@
           <a:p>
             <a:fld id="{730781BF-9B5A-584C-A5E5-2579FF7A588D}" type="datetimeFigureOut">
               <a:rPr lang="en-US" smtClean="0"/>
-              <a:t>7/11/24</a:t>
+              <a:t>8/30/24</a:t>
             </a:fld>
             <a:endParaRPr lang="en-US"/>
           </a:p>
@@ -1973,7 +2071,7 @@
           <a:p>
             <a:fld id="{730781BF-9B5A-584C-A5E5-2579FF7A588D}" type="datetimeFigureOut">
               <a:rPr lang="en-US" smtClean="0"/>
-              <a:t>7/11/24</a:t>
+              <a:t>8/30/24</a:t>
             </a:fld>
             <a:endParaRPr lang="en-US"/>
           </a:p>
@@ -2086,7 +2184,7 @@
           <a:p>
             <a:fld id="{730781BF-9B5A-584C-A5E5-2579FF7A588D}" type="datetimeFigureOut">
               <a:rPr lang="en-US" smtClean="0"/>
-              <a:t>7/11/24</a:t>
+              <a:t>8/30/24</a:t>
             </a:fld>
             <a:endParaRPr lang="en-US"/>
           </a:p>
@@ -2399,7 +2497,7 @@
           <a:p>
             <a:fld id="{730781BF-9B5A-584C-A5E5-2579FF7A588D}" type="datetimeFigureOut">
               <a:rPr lang="en-US" smtClean="0"/>
-              <a:t>7/11/24</a:t>
+              <a:t>8/30/24</a:t>
             </a:fld>
             <a:endParaRPr lang="en-US"/>
           </a:p>
@@ -2688,7 +2786,7 @@
           <a:p>
             <a:fld id="{730781BF-9B5A-584C-A5E5-2579FF7A588D}" type="datetimeFigureOut">
               <a:rPr lang="en-US" smtClean="0"/>
-              <a:t>7/11/24</a:t>
+              <a:t>8/30/24</a:t>
             </a:fld>
             <a:endParaRPr lang="en-US"/>
           </a:p>
@@ -2931,7 +3029,7 @@
           <a:p>
             <a:fld id="{730781BF-9B5A-584C-A5E5-2579FF7A588D}" type="datetimeFigureOut">
               <a:rPr lang="en-US" smtClean="0"/>
-              <a:t>7/11/24</a:t>
+              <a:t>8/30/24</a:t>
             </a:fld>
             <a:endParaRPr lang="en-US"/>
           </a:p>
@@ -3348,6 +3446,36 @@
           <a:chExt cx="0" cy="0"/>
         </a:xfrm>
       </p:grpSpPr>
+      <p:pic>
+        <p:nvPicPr>
+          <p:cNvPr id="5" name="Picture 4" descr="A group of goats in a forest&#10;&#10;Description automatically generated">
+            <a:extLst>
+              <a:ext uri="{FF2B5EF4-FFF2-40B4-BE49-F238E27FC236}">
+                <a16:creationId xmlns:a16="http://schemas.microsoft.com/office/drawing/2014/main" id="{0243DA93-4779-1423-9E42-8682219CD350}"/>
+              </a:ext>
+            </a:extLst>
+          </p:cNvPr>
+          <p:cNvPicPr>
+            <a:picLocks noChangeAspect="1"/>
+          </p:cNvPicPr>
+          <p:nvPr/>
+        </p:nvPicPr>
+        <p:blipFill>
+          <a:blip r:embed="rId2"/>
+          <a:stretch>
+            <a:fillRect/>
+          </a:stretch>
+        </p:blipFill>
+        <p:spPr>
+          <a:xfrm>
+            <a:off x="-80010" y="-123507"/>
+            <a:ext cx="12352020" cy="8119871"/>
+          </a:xfrm>
+          <a:prstGeom prst="rect">
+            <a:avLst/>
+          </a:prstGeom>
+        </p:spPr>
+      </p:pic>
       <p:sp>
         <p:nvSpPr>
           <p:cNvPr id="2" name="Title 1">
@@ -3364,14 +3492,26 @@
             <p:ph type="ctrTitle"/>
           </p:nvPr>
         </p:nvSpPr>
-        <p:spPr/>
-        <p:txBody>
-          <a:bodyPr/>
-          <a:lstStyle/>
-          <a:p>
-            <a:r>
-              <a:rPr lang="en-US" dirty="0"/>
-              <a:t>Update on Thesis Progress</a:t>
+        <p:spPr>
+          <a:xfrm>
+            <a:off x="240030" y="171450"/>
+            <a:ext cx="8823960" cy="2387600"/>
+          </a:xfrm>
+        </p:spPr>
+        <p:txBody>
+          <a:bodyPr>
+            <a:normAutofit/>
+          </a:bodyPr>
+          <a:lstStyle/>
+          <a:p>
+            <a:pPr algn="l"/>
+            <a:r>
+              <a:rPr lang="en-US" sz="4800" dirty="0">
+                <a:solidFill>
+                  <a:schemeClr val="bg1"/>
+                </a:solidFill>
+              </a:rPr>
+              <a:t>The negative external effects of deforestation on downstream populations in Brazil</a:t>
             </a:r>
           </a:p>
         </p:txBody>
@@ -3392,20 +3532,42 @@
             <p:ph type="subTitle" idx="1"/>
           </p:nvPr>
         </p:nvSpPr>
-        <p:spPr/>
-        <p:txBody>
-          <a:bodyPr/>
-          <a:lstStyle/>
-          <a:p>
-            <a:r>
-              <a:rPr lang="en-US" dirty="0"/>
-              <a:t>The negative external effects of deforestation on downstream populations in Brazil</a:t>
-            </a:r>
-          </a:p>
-          <a:p>
-            <a:r>
-              <a:rPr lang="en-US" i="1" dirty="0"/>
+        <p:spPr>
+          <a:xfrm>
+            <a:off x="2640330" y="5213668"/>
+            <a:ext cx="9144000" cy="1655762"/>
+          </a:xfrm>
+        </p:spPr>
+        <p:txBody>
+          <a:bodyPr>
+            <a:normAutofit/>
+          </a:bodyPr>
+          <a:lstStyle/>
+          <a:p>
+            <a:pPr algn="r"/>
+            <a:r>
+              <a:rPr lang="en-US" sz="3200" i="1" dirty="0">
+                <a:solidFill>
+                  <a:schemeClr val="bg1"/>
+                </a:solidFill>
+              </a:rPr>
               <a:t>Felix Schulz</a:t>
+            </a:r>
+            <a:endParaRPr lang="en-US" sz="3200" dirty="0">
+              <a:solidFill>
+                <a:schemeClr val="bg1"/>
+              </a:solidFill>
+            </a:endParaRPr>
+          </a:p>
+          <a:p>
+            <a:pPr algn="r"/>
+            <a:r>
+              <a:rPr lang="en-US" sz="3200" dirty="0">
+                <a:solidFill>
+                  <a:schemeClr val="bg1"/>
+                </a:solidFill>
+              </a:rPr>
+              <a:t>Master’s Thesis</a:t>
             </a:r>
           </a:p>
         </p:txBody>
@@ -3424,6 +3586,450 @@
 </file>
 
 <file path=ppt/slides/slide2.xml><?xml version="1.0" encoding="utf-8"?>
+<p:sld xmlns:a="http://schemas.openxmlformats.org/drawingml/2006/main" xmlns:r="http://schemas.openxmlformats.org/officeDocument/2006/relationships" xmlns:p="http://schemas.openxmlformats.org/presentationml/2006/main">
+  <p:cSld>
+    <p:spTree>
+      <p:nvGrpSpPr>
+        <p:cNvPr id="1" name=""/>
+        <p:cNvGrpSpPr/>
+        <p:nvPr/>
+      </p:nvGrpSpPr>
+      <p:grpSpPr>
+        <a:xfrm>
+          <a:off x="0" y="0"/>
+          <a:ext cx="0" cy="0"/>
+          <a:chOff x="0" y="0"/>
+          <a:chExt cx="0" cy="0"/>
+        </a:xfrm>
+      </p:grpSpPr>
+      <p:sp>
+        <p:nvSpPr>
+          <p:cNvPr id="2" name="Title 1">
+            <a:extLst>
+              <a:ext uri="{FF2B5EF4-FFF2-40B4-BE49-F238E27FC236}">
+                <a16:creationId xmlns:a16="http://schemas.microsoft.com/office/drawing/2014/main" id="{5AB0CA57-AC28-397C-C408-9A10C8F560AD}"/>
+              </a:ext>
+            </a:extLst>
+          </p:cNvPr>
+          <p:cNvSpPr>
+            <a:spLocks noGrp="1"/>
+          </p:cNvSpPr>
+          <p:nvPr>
+            <p:ph type="title"/>
+          </p:nvPr>
+        </p:nvSpPr>
+        <p:spPr/>
+        <p:txBody>
+          <a:bodyPr/>
+          <a:lstStyle/>
+          <a:p>
+            <a:r>
+              <a:rPr lang="en-GB" b="1" i="0" dirty="0">
+                <a:solidFill>
+                  <a:srgbClr val="222222"/>
+                </a:solidFill>
+                <a:effectLst/>
+                <a:latin typeface="Source Sans Pro" panose="020F0502020204030204" pitchFamily="34" charset="0"/>
+              </a:rPr>
+              <a:t>The Burden of the Amazon</a:t>
+            </a:r>
+            <a:br>
+              <a:rPr lang="en-GB" b="1" i="0" dirty="0">
+                <a:solidFill>
+                  <a:srgbClr val="222222"/>
+                </a:solidFill>
+                <a:effectLst/>
+                <a:latin typeface="Source Sans Pro" panose="020F0502020204030204" pitchFamily="34" charset="0"/>
+              </a:rPr>
+            </a:br>
+            <a:endParaRPr lang="en-US" dirty="0"/>
+          </a:p>
+        </p:txBody>
+      </p:sp>
+      <p:sp>
+        <p:nvSpPr>
+          <p:cNvPr id="3" name="Content Placeholder 2">
+            <a:extLst>
+              <a:ext uri="{FF2B5EF4-FFF2-40B4-BE49-F238E27FC236}">
+                <a16:creationId xmlns:a16="http://schemas.microsoft.com/office/drawing/2014/main" id="{5A90B19B-87E2-AA90-5F5A-7F6FCB39147E}"/>
+              </a:ext>
+            </a:extLst>
+          </p:cNvPr>
+          <p:cNvSpPr>
+            <a:spLocks noGrp="1"/>
+          </p:cNvSpPr>
+          <p:nvPr>
+            <p:ph idx="1"/>
+          </p:nvPr>
+        </p:nvSpPr>
+        <p:spPr/>
+        <p:txBody>
+          <a:bodyPr>
+            <a:normAutofit fontScale="70000" lnSpcReduction="20000"/>
+          </a:bodyPr>
+          <a:lstStyle/>
+          <a:p>
+            <a:pPr marL="0" indent="0" algn="l" fontAlgn="base">
+              <a:lnSpc>
+                <a:spcPct val="120000"/>
+              </a:lnSpc>
+              <a:buNone/>
+            </a:pPr>
+            <a:r>
+              <a:rPr lang="en-GB" b="0" i="0" dirty="0">
+                <a:solidFill>
+                  <a:srgbClr val="222222"/>
+                </a:solidFill>
+                <a:effectLst/>
+                <a:latin typeface="Helvetica" pitchFamily="2" charset="0"/>
+              </a:rPr>
+              <a:t>The Amazon rainforest is under severe danger of deforestation</a:t>
+            </a:r>
+          </a:p>
+          <a:p>
+            <a:pPr algn="l" fontAlgn="base">
+              <a:lnSpc>
+                <a:spcPct val="120000"/>
+              </a:lnSpc>
+              <a:buFont typeface="Arial" panose="020B0604020202020204" pitchFamily="34" charset="0"/>
+              <a:buChar char="•"/>
+            </a:pPr>
+            <a:r>
+              <a:rPr lang="en-GB" b="0" i="0" dirty="0">
+                <a:solidFill>
+                  <a:srgbClr val="222222"/>
+                </a:solidFill>
+                <a:effectLst/>
+                <a:latin typeface="Helvetica" pitchFamily="2" charset="0"/>
+              </a:rPr>
+              <a:t>Between 2002 and 2022, 8.6% of primary forests in Brazil were cleared (</a:t>
+            </a:r>
+            <a:r>
+              <a:rPr lang="en-GB" b="0" i="0" u="none" strike="noStrike" dirty="0">
+                <a:solidFill>
+                  <a:srgbClr val="222222"/>
+                </a:solidFill>
+                <a:effectLst/>
+                <a:latin typeface="Helvetica" pitchFamily="2" charset="0"/>
+                <a:hlinkClick r:id="rId2"/>
+              </a:rPr>
+              <a:t>World Resources Institute 2023</a:t>
+            </a:r>
+            <a:r>
+              <a:rPr lang="en-GB" b="0" i="0" dirty="0">
+                <a:solidFill>
+                  <a:srgbClr val="222222"/>
+                </a:solidFill>
+                <a:effectLst/>
+                <a:latin typeface="Helvetica" pitchFamily="2" charset="0"/>
+              </a:rPr>
+              <a:t>)</a:t>
+            </a:r>
+          </a:p>
+          <a:p>
+            <a:pPr algn="l" fontAlgn="base">
+              <a:lnSpc>
+                <a:spcPct val="120000"/>
+              </a:lnSpc>
+              <a:buFont typeface="Arial" panose="020B0604020202020204" pitchFamily="34" charset="0"/>
+              <a:buChar char="•"/>
+            </a:pPr>
+            <a:r>
+              <a:rPr lang="en-GB" b="0" i="0" dirty="0">
+                <a:solidFill>
+                  <a:srgbClr val="222222"/>
+                </a:solidFill>
+                <a:effectLst/>
+                <a:latin typeface="Helvetica" pitchFamily="2" charset="0"/>
+              </a:rPr>
+              <a:t>Land is mainly converted for agriculture, </a:t>
+            </a:r>
+            <a:r>
+              <a:rPr lang="en-GB" b="0" i="0" dirty="0" err="1">
+                <a:solidFill>
+                  <a:srgbClr val="222222"/>
+                </a:solidFill>
+                <a:effectLst/>
+                <a:latin typeface="Helvetica" pitchFamily="2" charset="0"/>
+              </a:rPr>
+              <a:t>lifestock</a:t>
+            </a:r>
+            <a:r>
+              <a:rPr lang="en-GB" b="0" i="0" dirty="0">
+                <a:solidFill>
+                  <a:srgbClr val="222222"/>
+                </a:solidFill>
+                <a:effectLst/>
+                <a:latin typeface="Helvetica" pitchFamily="2" charset="0"/>
+              </a:rPr>
+              <a:t> or mining (</a:t>
+            </a:r>
+            <a:r>
+              <a:rPr lang="en-GB" b="0" i="0" u="none" strike="noStrike" dirty="0">
+                <a:solidFill>
+                  <a:srgbClr val="222222"/>
+                </a:solidFill>
+                <a:effectLst/>
+                <a:latin typeface="Helvetica" pitchFamily="2" charset="0"/>
+                <a:hlinkClick r:id="rId2"/>
+              </a:rPr>
+              <a:t>Barona et al. 2010</a:t>
+            </a:r>
+            <a:r>
+              <a:rPr lang="en-GB" b="0" i="0" dirty="0">
+                <a:solidFill>
+                  <a:srgbClr val="222222"/>
+                </a:solidFill>
+                <a:effectLst/>
+                <a:latin typeface="Helvetica" pitchFamily="2" charset="0"/>
+              </a:rPr>
+              <a:t>; </a:t>
+            </a:r>
+            <a:r>
+              <a:rPr lang="en-GB" b="0" i="0" u="none" strike="noStrike" dirty="0">
+                <a:solidFill>
+                  <a:srgbClr val="222222"/>
+                </a:solidFill>
+                <a:effectLst/>
+                <a:latin typeface="Helvetica" pitchFamily="2" charset="0"/>
+                <a:hlinkClick r:id="rId2"/>
+              </a:rPr>
+              <a:t>Sonter et al. 2017</a:t>
+            </a:r>
+            <a:r>
+              <a:rPr lang="en-GB" b="0" i="0" dirty="0">
+                <a:solidFill>
+                  <a:srgbClr val="222222"/>
+                </a:solidFill>
+                <a:effectLst/>
+                <a:latin typeface="Helvetica" pitchFamily="2" charset="0"/>
+              </a:rPr>
+              <a:t>)</a:t>
+            </a:r>
+          </a:p>
+          <a:p>
+            <a:pPr marL="0" indent="0" algn="l" fontAlgn="base">
+              <a:lnSpc>
+                <a:spcPct val="120000"/>
+              </a:lnSpc>
+              <a:buNone/>
+            </a:pPr>
+            <a:endParaRPr lang="en-GB" b="0" i="0" dirty="0">
+              <a:solidFill>
+                <a:srgbClr val="222222"/>
+              </a:solidFill>
+              <a:effectLst/>
+              <a:latin typeface="Helvetica" pitchFamily="2" charset="0"/>
+            </a:endParaRPr>
+          </a:p>
+          <a:p>
+            <a:pPr marL="0" indent="0" algn="l" fontAlgn="base">
+              <a:lnSpc>
+                <a:spcPct val="120000"/>
+              </a:lnSpc>
+              <a:buNone/>
+            </a:pPr>
+            <a:r>
+              <a:rPr lang="en-GB" b="0" i="0" dirty="0">
+                <a:solidFill>
+                  <a:srgbClr val="222222"/>
+                </a:solidFill>
+                <a:effectLst/>
+                <a:latin typeface="Helvetica" pitchFamily="2" charset="0"/>
+              </a:rPr>
+              <a:t>Opinions in Brazil diverge widely:</a:t>
+            </a:r>
+          </a:p>
+          <a:p>
+            <a:pPr marL="457200" lvl="1" indent="0" fontAlgn="base">
+              <a:lnSpc>
+                <a:spcPct val="120000"/>
+              </a:lnSpc>
+              <a:buNone/>
+            </a:pPr>
+            <a:r>
+              <a:rPr lang="en-GB" b="0" i="0" dirty="0">
+                <a:solidFill>
+                  <a:schemeClr val="tx1">
+                    <a:lumMod val="65000"/>
+                    <a:lumOff val="35000"/>
+                  </a:schemeClr>
+                </a:solidFill>
+                <a:effectLst/>
+                <a:latin typeface="Helvetica" pitchFamily="2" charset="0"/>
+              </a:rPr>
+              <a:t>Let’s use the riches that God gave us for the wellbeing of our population.</a:t>
+            </a:r>
+          </a:p>
+          <a:p>
+            <a:pPr marL="0" indent="0" algn="r" fontAlgn="base">
+              <a:lnSpc>
+                <a:spcPct val="120000"/>
+              </a:lnSpc>
+              <a:buNone/>
+            </a:pPr>
+            <a:r>
+              <a:rPr lang="en-GB" b="0" i="0" dirty="0">
+                <a:solidFill>
+                  <a:srgbClr val="222222"/>
+                </a:solidFill>
+                <a:effectLst/>
+                <a:latin typeface="Helvetica" pitchFamily="2" charset="0"/>
+              </a:rPr>
+              <a:t>Jair Bolsonaro, President of Brazil (</a:t>
+            </a:r>
+            <a:r>
+              <a:rPr lang="en-GB" b="0" i="0" u="none" strike="noStrike" dirty="0">
+                <a:solidFill>
+                  <a:srgbClr val="222222"/>
+                </a:solidFill>
+                <a:effectLst/>
+                <a:latin typeface="Helvetica" pitchFamily="2" charset="0"/>
+                <a:hlinkClick r:id="rId2"/>
+              </a:rPr>
+              <a:t>2019</a:t>
+            </a:r>
+            <a:r>
+              <a:rPr lang="en-GB" b="0" i="0" dirty="0">
+                <a:solidFill>
+                  <a:srgbClr val="222222"/>
+                </a:solidFill>
+                <a:effectLst/>
+                <a:latin typeface="Helvetica" pitchFamily="2" charset="0"/>
+              </a:rPr>
+              <a:t>)</a:t>
+            </a:r>
+          </a:p>
+          <a:p>
+            <a:pPr marL="457200" lvl="1" indent="0" fontAlgn="base">
+              <a:lnSpc>
+                <a:spcPct val="120000"/>
+              </a:lnSpc>
+              <a:buNone/>
+            </a:pPr>
+            <a:r>
+              <a:rPr lang="en-GB" b="0" i="0" dirty="0">
+                <a:solidFill>
+                  <a:schemeClr val="tx1">
+                    <a:lumMod val="65000"/>
+                    <a:lumOff val="35000"/>
+                  </a:schemeClr>
+                </a:solidFill>
+                <a:effectLst/>
+                <a:latin typeface="Helvetica" pitchFamily="2" charset="0"/>
+              </a:rPr>
+              <a:t>We will do whatever it takes to have zero deforestation and degradation of our biomes.</a:t>
+            </a:r>
+          </a:p>
+          <a:p>
+            <a:pPr marL="0" indent="0" algn="r" fontAlgn="base">
+              <a:lnSpc>
+                <a:spcPct val="120000"/>
+              </a:lnSpc>
+              <a:buNone/>
+            </a:pPr>
+            <a:r>
+              <a:rPr lang="en-GB" b="0" i="0" dirty="0">
+                <a:solidFill>
+                  <a:srgbClr val="222222"/>
+                </a:solidFill>
+                <a:effectLst/>
+                <a:latin typeface="Helvetica" pitchFamily="2" charset="0"/>
+              </a:rPr>
+              <a:t>‘Lula’ da Silva, President of Brazil (</a:t>
+            </a:r>
+            <a:r>
+              <a:rPr lang="en-GB" b="0" i="0" u="none" strike="noStrike" dirty="0">
+                <a:solidFill>
+                  <a:srgbClr val="222222"/>
+                </a:solidFill>
+                <a:effectLst/>
+                <a:latin typeface="Helvetica" pitchFamily="2" charset="0"/>
+                <a:hlinkClick r:id="rId2"/>
+              </a:rPr>
+              <a:t>2022</a:t>
+            </a:r>
+            <a:r>
+              <a:rPr lang="en-GB" b="0" i="0" dirty="0">
+                <a:solidFill>
+                  <a:srgbClr val="222222"/>
+                </a:solidFill>
+                <a:effectLst/>
+                <a:latin typeface="Helvetica" pitchFamily="2" charset="0"/>
+              </a:rPr>
+              <a:t>)</a:t>
+            </a:r>
+          </a:p>
+          <a:p>
+            <a:pPr>
+              <a:lnSpc>
+                <a:spcPct val="120000"/>
+              </a:lnSpc>
+            </a:pPr>
+            <a:endParaRPr lang="en-US" dirty="0">
+              <a:latin typeface="Helvetica" pitchFamily="2" charset="0"/>
+            </a:endParaRPr>
+          </a:p>
+        </p:txBody>
+      </p:sp>
+      <p:cxnSp>
+        <p:nvCxnSpPr>
+          <p:cNvPr id="7" name="Straight Connector 6">
+            <a:extLst>
+              <a:ext uri="{FF2B5EF4-FFF2-40B4-BE49-F238E27FC236}">
+                <a16:creationId xmlns:a16="http://schemas.microsoft.com/office/drawing/2014/main" id="{FE72FFD6-1F97-7345-1C51-28EB9D195412}"/>
+              </a:ext>
+            </a:extLst>
+          </p:cNvPr>
+          <p:cNvCxnSpPr/>
+          <p:nvPr/>
+        </p:nvCxnSpPr>
+        <p:spPr>
+          <a:xfrm>
+            <a:off x="948690" y="4549140"/>
+            <a:ext cx="0" cy="308610"/>
+          </a:xfrm>
+          <a:prstGeom prst="line">
+            <a:avLst/>
+          </a:prstGeom>
+          <a:ln>
+            <a:solidFill>
+              <a:schemeClr val="tx1">
+                <a:lumMod val="65000"/>
+                <a:lumOff val="35000"/>
+              </a:schemeClr>
+            </a:solidFill>
+          </a:ln>
+        </p:spPr>
+        <p:style>
+          <a:lnRef idx="2">
+            <a:schemeClr val="accent1"/>
+          </a:lnRef>
+          <a:fillRef idx="0">
+            <a:schemeClr val="accent1"/>
+          </a:fillRef>
+          <a:effectRef idx="1">
+            <a:schemeClr val="accent1"/>
+          </a:effectRef>
+          <a:fontRef idx="minor">
+            <a:schemeClr val="tx1"/>
+          </a:fontRef>
+        </p:style>
+      </p:cxnSp>
+    </p:spTree>
+    <p:extLst>
+      <p:ext uri="{BB962C8B-B14F-4D97-AF65-F5344CB8AC3E}">
+        <p14:creationId xmlns:p14="http://schemas.microsoft.com/office/powerpoint/2010/main" val="2389481547"/>
+      </p:ext>
+    </p:extLst>
+  </p:cSld>
+  <p:clrMapOvr>
+    <a:masterClrMapping/>
+  </p:clrMapOvr>
+</p:sld>
+</file>
+
+<file path=ppt/slides/slide3.xml><?xml version="1.0" encoding="utf-8"?>
 <p:sld xmlns:a="http://schemas.openxmlformats.org/drawingml/2006/main" xmlns:r="http://schemas.openxmlformats.org/officeDocument/2006/relationships" xmlns:p="http://schemas.openxmlformats.org/presentationml/2006/main">
   <p:cSld>
     <p:spTree>
@@ -3901,7 +4507,7 @@
 </p:sld>
 </file>
 
-<file path=ppt/slides/slide3.xml><?xml version="1.0" encoding="utf-8"?>
+<file path=ppt/slides/slide4.xml><?xml version="1.0" encoding="utf-8"?>
 <p:sld xmlns:a="http://schemas.openxmlformats.org/drawingml/2006/main" xmlns:r="http://schemas.openxmlformats.org/officeDocument/2006/relationships" xmlns:p="http://schemas.openxmlformats.org/presentationml/2006/main">
   <p:cSld>
     <p:spTree>
@@ -4027,7 +4633,7 @@
 </p:sld>
 </file>
 
-<file path=ppt/slides/slide4.xml><?xml version="1.0" encoding="utf-8"?>
+<file path=ppt/slides/slide5.xml><?xml version="1.0" encoding="utf-8"?>
 <p:sld xmlns:a="http://schemas.openxmlformats.org/drawingml/2006/main" xmlns:r="http://schemas.openxmlformats.org/officeDocument/2006/relationships" xmlns:p="http://schemas.openxmlformats.org/presentationml/2006/main">
   <p:cSld>
     <p:spTree>
@@ -4149,7 +4755,7 @@
 </p:sld>
 </file>
 
-<file path=ppt/slides/slide5.xml><?xml version="1.0" encoding="utf-8"?>
+<file path=ppt/slides/slide6.xml><?xml version="1.0" encoding="utf-8"?>
 <p:sld xmlns:a="http://schemas.openxmlformats.org/drawingml/2006/main" xmlns:r="http://schemas.openxmlformats.org/officeDocument/2006/relationships" xmlns:p="http://schemas.openxmlformats.org/presentationml/2006/main">
   <p:cSld>
     <p:spTree>
@@ -4285,7 +4891,7 @@
 </p:sld>
 </file>
 
-<file path=ppt/slides/slide6.xml><?xml version="1.0" encoding="utf-8"?>
+<file path=ppt/slides/slide7.xml><?xml version="1.0" encoding="utf-8"?>
 <p:sld xmlns:a="http://schemas.openxmlformats.org/drawingml/2006/main" xmlns:r="http://schemas.openxmlformats.org/officeDocument/2006/relationships" xmlns:p="http://schemas.openxmlformats.org/presentationml/2006/main">
   <p:cSld>
     <p:spTree>
@@ -4411,7 +5017,7 @@
 </p:sld>
 </file>
 
-<file path=ppt/slides/slide7.xml><?xml version="1.0" encoding="utf-8"?>
+<file path=ppt/slides/slide8.xml><?xml version="1.0" encoding="utf-8"?>
 <p:sld xmlns:a="http://schemas.openxmlformats.org/drawingml/2006/main" xmlns:r="http://schemas.openxmlformats.org/officeDocument/2006/relationships" xmlns:p="http://schemas.openxmlformats.org/presentationml/2006/main">
   <p:cSld>
     <p:spTree>

</xml_diff>